<commit_message>
add RSI definition to presentation
</commit_message>
<xml_diff>
--- a/docs/presentation.pptx
+++ b/docs/presentation.pptx
@@ -115,6 +115,11 @@
       </a:defRPr>
     </a:lvl9pPr>
   </p:defaultTextStyle>
+  <p:extLst>
+    <p:ext uri="{EFAFB233-063F-42B5-8137-9DF3F51BA10A}">
+      <p15:sldGuideLst xmlns:p15="http://schemas.microsoft.com/office/powerpoint/2012/main"/>
+    </p:ext>
+  </p:extLst>
 </p:presentation>
 </file>
 
@@ -7776,9 +7781,16 @@
             <p:ph sz="quarter" idx="4"/>
           </p:nvPr>
         </p:nvSpPr>
-        <p:spPr/>
-        <p:txBody>
-          <a:bodyPr/>
+        <p:spPr>
+          <a:xfrm>
+            <a:off x="5088384" y="2737246"/>
+            <a:ext cx="4185617" cy="1512370"/>
+          </a:xfrm>
+        </p:spPr>
+        <p:txBody>
+          <a:bodyPr>
+            <a:normAutofit lnSpcReduction="10000"/>
+          </a:bodyPr>
           <a:lstStyle/>
           <a:p>
             <a:r>
@@ -7798,18 +7810,40 @@
           <a:p>
             <a:r>
               <a:rPr lang="en-US" dirty="0" smtClean="0"/>
-              <a:t>Common period is 14</a:t>
-            </a:r>
-          </a:p>
-          <a:p>
+              <a:t>Here </a:t>
+            </a:r>
             <a:r>
               <a:rPr lang="en-US" dirty="0" smtClean="0"/>
-              <a:t>Here we using the same values as the ones for moving averages</a:t>
+              <a:t>we using the same values as the ones for moving averages</a:t>
             </a:r>
             <a:endParaRPr lang="en-US" dirty="0"/>
           </a:p>
         </p:txBody>
       </p:sp>
+      <p:pic>
+        <p:nvPicPr>
+          <p:cNvPr id="2" name="Picture 1"/>
+          <p:cNvPicPr>
+            <a:picLocks noChangeAspect="1"/>
+          </p:cNvPicPr>
+          <p:nvPr/>
+        </p:nvPicPr>
+        <p:blipFill>
+          <a:blip r:embed="rId2"/>
+          <a:stretch>
+            <a:fillRect/>
+          </a:stretch>
+        </p:blipFill>
+        <p:spPr>
+          <a:xfrm>
+            <a:off x="5061879" y="4364909"/>
+            <a:ext cx="4238625" cy="1438275"/>
+          </a:xfrm>
+          <a:prstGeom prst="rect">
+            <a:avLst/>
+          </a:prstGeom>
+        </p:spPr>
+      </p:pic>
     </p:spTree>
     <p:extLst>
       <p:ext uri="{BB962C8B-B14F-4D97-AF65-F5344CB8AC3E}">
@@ -7931,7 +7965,6 @@
               <a:rPr lang="en-US" sz="1600" dirty="0"/>
               <a:t>1d_volume_pct</a:t>
             </a:r>
-            <a:endParaRPr lang="en-US" sz="1600" dirty="0"/>
           </a:p>
           <a:p>
             <a:pPr marL="342900" lvl="1" indent="-342900"/>
@@ -7944,11 +7977,7 @@
             <a:pPr marL="800100" lvl="3" indent="-342900"/>
             <a:r>
               <a:rPr lang="en-US" sz="1600" dirty="0"/>
-              <a:t>14</a:t>
-            </a:r>
-            <a:r>
-              <a:rPr lang="en-US" sz="1600" dirty="0"/>
-              <a:t>, 30, 50, 200 moving average for both </a:t>
+              <a:t>14, 30, 50, 200 moving average for both </a:t>
             </a:r>
             <a:r>
               <a:rPr lang="en-US" sz="1600" dirty="0" err="1"/>
@@ -8532,8 +8561,8 @@
           </a:p>
         </p:txBody>
       </p:sp>
-      <mc:AlternateContent xmlns:mc="http://schemas.openxmlformats.org/markup-compatibility/2006">
-        <mc:Choice xmlns:a14="http://schemas.microsoft.com/office/drawing/2010/main" Requires="a14">
+      <mc:AlternateContent xmlns:mc="http://schemas.openxmlformats.org/markup-compatibility/2006" xmlns:a14="http://schemas.microsoft.com/office/drawing/2010/main">
+        <mc:Choice Requires="a14">
           <p:sp>
             <p:nvSpPr>
               <p:cNvPr id="24" name="TextBox 23"/>
@@ -8556,6 +8585,7 @@
               </a:bodyPr>
               <a:lstStyle/>
               <a:p>
+                <a:pPr/>
                 <a14:m>
                   <m:oMathPara xmlns:m="http://schemas.openxmlformats.org/officeDocument/2006/math">
                     <m:oMathParaPr>
@@ -8678,7 +8708,7 @@
             </p:txBody>
           </p:sp>
         </mc:Choice>
-        <mc:Fallback>
+        <mc:Fallback xmlns="">
           <p:sp>
             <p:nvSpPr>
               <p:cNvPr id="24" name="TextBox 23"/>
@@ -8993,8 +9023,8 @@
           </a:p>
         </p:txBody>
       </p:sp>
-      <mc:AlternateContent xmlns:mc="http://schemas.openxmlformats.org/markup-compatibility/2006">
-        <mc:Choice xmlns:a14="http://schemas.microsoft.com/office/drawing/2010/main" Requires="a14">
+      <mc:AlternateContent xmlns:mc="http://schemas.openxmlformats.org/markup-compatibility/2006" xmlns:a14="http://schemas.microsoft.com/office/drawing/2010/main">
+        <mc:Choice Requires="a14">
           <p:sp>
             <p:nvSpPr>
               <p:cNvPr id="41" name="TextBox 40"/>
@@ -9283,7 +9313,7 @@
             </p:txBody>
           </p:sp>
         </mc:Choice>
-        <mc:Fallback>
+        <mc:Fallback xmlns="">
           <p:sp>
             <p:nvSpPr>
               <p:cNvPr id="41" name="TextBox 40"/>
@@ -9375,8 +9405,8 @@
           </a:p>
         </p:txBody>
       </p:sp>
-      <mc:AlternateContent xmlns:mc="http://schemas.openxmlformats.org/markup-compatibility/2006">
-        <mc:Choice xmlns:a14="http://schemas.microsoft.com/office/drawing/2010/main" Requires="a14">
+      <mc:AlternateContent xmlns:mc="http://schemas.openxmlformats.org/markup-compatibility/2006" xmlns:a14="http://schemas.microsoft.com/office/drawing/2010/main">
+        <mc:Choice Requires="a14">
           <p:sp>
             <p:nvSpPr>
               <p:cNvPr id="3" name="TextBox 2"/>
@@ -9691,7 +9721,7 @@
             </p:txBody>
           </p:sp>
         </mc:Choice>
-        <mc:Fallback>
+        <mc:Fallback xmlns="">
           <p:sp>
             <p:nvSpPr>
               <p:cNvPr id="3" name="TextBox 2"/>
@@ -9730,8 +9760,8 @@
           </p:sp>
         </mc:Fallback>
       </mc:AlternateContent>
-      <mc:AlternateContent xmlns:mc="http://schemas.openxmlformats.org/markup-compatibility/2006">
-        <mc:Choice xmlns:a14="http://schemas.microsoft.com/office/drawing/2010/main" Requires="a14">
+      <mc:AlternateContent xmlns:mc="http://schemas.openxmlformats.org/markup-compatibility/2006" xmlns:a14="http://schemas.microsoft.com/office/drawing/2010/main">
+        <mc:Choice Requires="a14">
           <p:sp>
             <p:nvSpPr>
               <p:cNvPr id="5" name="TextBox 4"/>
@@ -9884,7 +9914,7 @@
             </p:txBody>
           </p:sp>
         </mc:Choice>
-        <mc:Fallback>
+        <mc:Fallback xmlns="">
           <p:sp>
             <p:nvSpPr>
               <p:cNvPr id="5" name="TextBox 4"/>
@@ -9923,8 +9953,8 @@
           </p:sp>
         </mc:Fallback>
       </mc:AlternateContent>
-      <mc:AlternateContent xmlns:mc="http://schemas.openxmlformats.org/markup-compatibility/2006">
-        <mc:Choice xmlns:a14="http://schemas.microsoft.com/office/drawing/2010/main" Requires="a14">
+      <mc:AlternateContent xmlns:mc="http://schemas.openxmlformats.org/markup-compatibility/2006" xmlns:a14="http://schemas.microsoft.com/office/drawing/2010/main">
+        <mc:Choice Requires="a14">
           <p:sp>
             <p:nvSpPr>
               <p:cNvPr id="6" name="TextBox 5"/>
@@ -10151,7 +10181,7 @@
             </p:txBody>
           </p:sp>
         </mc:Choice>
-        <mc:Fallback>
+        <mc:Fallback xmlns="">
           <p:sp>
             <p:nvSpPr>
               <p:cNvPr id="6" name="TextBox 5"/>

</xml_diff>